<commit_message>
small reorg in ppt, pdf version
</commit_message>
<xml_diff>
--- a/cansat_debug.pptx
+++ b/cansat_debug.pptx
@@ -39185,6 +39185,24 @@
             </a:r>
           </a:p>
           <a:p>
+            <a:pPr lvl="1"/>
+            <a:r>
+              <a:rPr lang="en-HU" dirty="0"/>
+              <a:t>Mesterségesen abba az állapotba vinni az eszközt</a:t>
+            </a:r>
+          </a:p>
+          <a:p>
+            <a:pPr lvl="2"/>
+            <a:r>
+              <a:rPr lang="en-GB" dirty="0"/>
+              <a:t>P</a:t>
+            </a:r>
+            <a:r>
+              <a:rPr lang="en-HU" dirty="0"/>
+              <a:t>l timer túlcsordulás körüli hiba esetén timert túlcsordulás előtti állapotban indítani</a:t>
+            </a:r>
+          </a:p>
+          <a:p>
             <a:r>
               <a:rPr lang="en-HU" dirty="0"/>
               <a:t>In-circuit debug</a:t>
@@ -39215,24 +39233,6 @@
             <a:r>
               <a:rPr lang="en-HU" dirty="0"/>
               <a:t>Ha a logból nem látszik semmi: több logolás</a:t>
-            </a:r>
-          </a:p>
-          <a:p>
-            <a:pPr lvl="1"/>
-            <a:r>
-              <a:rPr lang="en-HU" dirty="0"/>
-              <a:t>Ha látszódik valami: mesterségesen abba az állapotba vinni az eszközt</a:t>
-            </a:r>
-          </a:p>
-          <a:p>
-            <a:pPr lvl="2"/>
-            <a:r>
-              <a:rPr lang="en-GB" dirty="0"/>
-              <a:t>P</a:t>
-            </a:r>
-            <a:r>
-              <a:rPr lang="en-HU" dirty="0"/>
-              <a:t>l timer túlcsordulás körüli hiba esetén timert túlcsordulás előtti állapotban indítani</a:t>
             </a:r>
           </a:p>
           <a:p>
@@ -40208,10 +40208,9 @@
           <a:p>
             <a:pPr lvl="1"/>
             <a:r>
-              <a:rPr lang="en-HU"/>
+              <a:rPr lang="en-HU" dirty="0"/>
               <a:t>Valójában nem megy ki a csomag, vagy nem az amit szeretnénk</a:t>
             </a:r>
-            <a:endParaRPr lang="en-HU" dirty="0"/>
           </a:p>
           <a:p>
             <a:pPr lvl="1"/>

</xml_diff>

<commit_message>
removed rarely occuring bugs slide to save time
</commit_message>
<xml_diff>
--- a/cansat_debug.pptx
+++ b/cansat_debug.pptx
@@ -38993,7 +38993,7 @@
 </file>
 
 <file path=ppt/slides/slide13.xml><?xml version="1.0" encoding="utf-8"?>
-<p:sld xmlns:a="http://schemas.openxmlformats.org/drawingml/2006/main" xmlns:r="http://schemas.openxmlformats.org/officeDocument/2006/relationships" xmlns:p="http://schemas.openxmlformats.org/presentationml/2006/main">
+<p:sld xmlns:a="http://schemas.openxmlformats.org/drawingml/2006/main" xmlns:r="http://schemas.openxmlformats.org/officeDocument/2006/relationships" xmlns:p="http://schemas.openxmlformats.org/presentationml/2006/main" show="0">
   <p:cSld>
     <p:spTree>
       <p:nvGrpSpPr>
@@ -42798,10 +42798,9 @@
           <a:p>
             <a:pPr lvl="2"/>
             <a:r>
-              <a:rPr lang="en-HU"/>
+              <a:rPr lang="en-HU" dirty="0"/>
               <a:t>Raspberry Pi Pico használható erre</a:t>
             </a:r>
-            <a:endParaRPr lang="en-HU" dirty="0"/>
           </a:p>
         </p:txBody>
       </p:sp>

</xml_diff>